<commit_message>
Update accessibility arrow color
</commit_message>
<xml_diff>
--- a/cai/redo-2024/Slides/03-01-python4e.01.111716.pptx
+++ b/cai/redo-2024/Slides/03-01-python4e.01.111716.pptx
@@ -15134,138 +15134,6 @@
             </a:r>
           </a:p>
           <a:p>
-            <a:pPr marL="1041400" marR="0" lvl="1" indent="-345694" algn="l" rtl="0">
-              <a:lnSpc>
-                <a:spcPct val="100000"/>
-              </a:lnSpc>
-              <a:spcBef>
-                <a:spcPts val="3500"/>
-              </a:spcBef>
-              <a:spcAft>
-                <a:spcPts val="0"/>
-              </a:spcAft>
-              <a:buClr>
-                <a:schemeClr val="lt1"/>
-              </a:buClr>
-              <a:buSzPct val="100000"/>
-              <a:buFont typeface="Cabin"/>
-            </a:pPr>
-            <a:r>
-              <a:rPr lang="en-US" sz="3200" b="0" u="none" strike="noStrike" cap="none" dirty="0" err="1">
-                <a:solidFill>
-                  <a:schemeClr val="lt1"/>
-                </a:solidFill>
-                <a:latin typeface="Arial" charset="0"/>
-                <a:ea typeface="Arial" charset="0"/>
-                <a:cs typeface="Arial" charset="0"/>
-                <a:sym typeface="Cabin"/>
-              </a:rPr>
-              <a:t>NotePad</a:t>
-            </a:r>
-            <a:r>
-              <a:rPr lang="en-US" sz="3200" b="0" u="none" strike="noStrike" cap="none" dirty="0">
-                <a:solidFill>
-                  <a:schemeClr val="lt1"/>
-                </a:solidFill>
-                <a:latin typeface="Arial" charset="0"/>
-                <a:ea typeface="Arial" charset="0"/>
-                <a:cs typeface="Arial" charset="0"/>
-                <a:sym typeface="Cabin"/>
-              </a:rPr>
-              <a:t>++:  Settings -&gt; Preferences -&gt; Language Menu/</a:t>
-            </a:r>
-            <a:r>
-              <a:rPr lang="en-US" sz="3200" b="0" u="none" strike="noStrike" cap="none" dirty="0">
-                <a:solidFill>
-                  <a:srgbClr val="FF9900"/>
-                </a:solidFill>
-                <a:latin typeface="Arial" charset="0"/>
-                <a:ea typeface="Arial" charset="0"/>
-                <a:cs typeface="Arial" charset="0"/>
-                <a:sym typeface="Cabin"/>
-              </a:rPr>
-              <a:t>Tab</a:t>
-            </a:r>
-            <a:r>
-              <a:rPr lang="en-US" sz="3200" b="0" u="none" strike="noStrike" cap="none" dirty="0">
-                <a:solidFill>
-                  <a:schemeClr val="lt1"/>
-                </a:solidFill>
-                <a:latin typeface="Arial" charset="0"/>
-                <a:ea typeface="Arial" charset="0"/>
-                <a:cs typeface="Arial" charset="0"/>
-                <a:sym typeface="Cabin"/>
-              </a:rPr>
-              <a:t> Settings</a:t>
-            </a:r>
-          </a:p>
-          <a:p>
-            <a:pPr marL="1041400" marR="0" lvl="1" indent="-345694" algn="l" rtl="0">
-              <a:lnSpc>
-                <a:spcPct val="100000"/>
-              </a:lnSpc>
-              <a:spcBef>
-                <a:spcPts val="3500"/>
-              </a:spcBef>
-              <a:spcAft>
-                <a:spcPts val="0"/>
-              </a:spcAft>
-              <a:buClr>
-                <a:schemeClr val="lt1"/>
-              </a:buClr>
-              <a:buSzPct val="100000"/>
-              <a:buFont typeface="Cabin"/>
-            </a:pPr>
-            <a:r>
-              <a:rPr lang="en-US" sz="3200" b="0" u="none" strike="noStrike" cap="none" dirty="0" err="1">
-                <a:solidFill>
-                  <a:schemeClr val="lt1"/>
-                </a:solidFill>
-                <a:latin typeface="Arial" charset="0"/>
-                <a:ea typeface="Arial" charset="0"/>
-                <a:cs typeface="Arial" charset="0"/>
-                <a:sym typeface="Cabin"/>
-              </a:rPr>
-              <a:t>TextWrangler</a:t>
-            </a:r>
-            <a:r>
-              <a:rPr lang="en-US" sz="3200" b="0" u="none" strike="noStrike" cap="none" dirty="0">
-                <a:solidFill>
-                  <a:schemeClr val="lt1"/>
-                </a:solidFill>
-                <a:latin typeface="Arial" charset="0"/>
-                <a:ea typeface="Arial" charset="0"/>
-                <a:cs typeface="Arial" charset="0"/>
-                <a:sym typeface="Cabin"/>
-              </a:rPr>
-              <a:t>:  </a:t>
-            </a:r>
-            <a:r>
-              <a:rPr lang="en-US" sz="3200" b="0" u="none" strike="noStrike" cap="none" dirty="0" err="1">
-                <a:solidFill>
-                  <a:schemeClr val="lt1"/>
-                </a:solidFill>
-                <a:latin typeface="Arial" charset="0"/>
-                <a:ea typeface="Arial" charset="0"/>
-                <a:cs typeface="Arial" charset="0"/>
-                <a:sym typeface="Cabin"/>
-              </a:rPr>
-              <a:t>TextWrangler</a:t>
-            </a:r>
-            <a:r>
-              <a:rPr lang="en-US" sz="3200" b="0" u="none" strike="noStrike" cap="none" dirty="0">
-                <a:solidFill>
-                  <a:schemeClr val="lt1"/>
-                </a:solidFill>
-                <a:latin typeface="Arial" charset="0"/>
-                <a:ea typeface="Arial" charset="0"/>
-                <a:cs typeface="Arial" charset="0"/>
-                <a:sym typeface="Cabin"/>
-              </a:rPr>
-              <a:t> -&gt; Preferences -&gt; Editor Defaults</a:t>
-            </a:r>
-          </a:p>
-          <a:p>
             <a:pPr marL="749300" marR="0" lvl="0" indent="-345694" algn="l" rtl="0">
               <a:lnSpc>
                 <a:spcPct val="100000"/>
@@ -15284,7 +15152,7 @@
               <a:buChar char="•"/>
             </a:pPr>
             <a:r>
-              <a:rPr lang="en-US" sz="3200" b="0" u="none" strike="noStrike" cap="none" dirty="0">
+              <a:rPr lang="en-US" sz="3200" b="0" u="none" strike="noStrike" cap="none">
                 <a:solidFill>
                   <a:schemeClr val="lt1"/>
                 </a:solidFill>
@@ -15293,7 +15161,19 @@
                 <a:cs typeface="Arial" charset="0"/>
                 <a:sym typeface="Cabin"/>
               </a:rPr>
-              <a:t>Python cares a *lot* about how far a line is </a:t>
+              <a:t>Python </a:t>
+            </a:r>
+            <a:r>
+              <a:rPr lang="en-US" sz="3200" b="0" u="none" strike="noStrike" cap="none" dirty="0">
+                <a:solidFill>
+                  <a:schemeClr val="lt1"/>
+                </a:solidFill>
+                <a:latin typeface="Arial" charset="0"/>
+                <a:ea typeface="Arial" charset="0"/>
+                <a:cs typeface="Arial" charset="0"/>
+                <a:sym typeface="Cabin"/>
+              </a:rPr>
+              <a:t>cares a *lot* about how far a line is </a:t>
             </a:r>
             <a:r>
               <a:rPr lang="en-US" sz="3200" b="0" u="none" strike="noStrike" cap="none" dirty="0">

</xml_diff>